<commit_message>
Added some tree output
</commit_message>
<xml_diff>
--- a/Solving General Steiner Tree Problem Using Quantum Annealing.pptx
+++ b/Solving General Steiner Tree Problem Using Quantum Annealing.pptx
@@ -41,6 +41,9 @@
     <p:sldId id="286" r:id="rId35"/>
     <p:sldId id="289" r:id="rId36"/>
     <p:sldId id="291" r:id="rId37"/>
+    <p:sldId id="292" r:id="rId38"/>
+    <p:sldId id="293" r:id="rId39"/>
+    <p:sldId id="294" r:id="rId40"/>
   </p:sldIdLst>
   <p:sldSz cx="12192000" cy="6858000"/>
   <p:notesSz cx="6858000" cy="9144000"/>
@@ -294,7 +297,7 @@
           <a:p>
             <a:fld id="{CEE5B302-F809-4B5B-A910-C95D7EA268A8}" type="datetimeFigureOut">
               <a:rPr lang="en-US" smtClean="0"/>
-              <a:t>30/11/2023</a:t>
+              <a:t>3/12/2023</a:t>
             </a:fld>
             <a:endParaRPr lang="en-US"/>
           </a:p>
@@ -492,7 +495,7 @@
           <a:p>
             <a:fld id="{CEE5B302-F809-4B5B-A910-C95D7EA268A8}" type="datetimeFigureOut">
               <a:rPr lang="en-US" smtClean="0"/>
-              <a:t>30/11/2023</a:t>
+              <a:t>3/12/2023</a:t>
             </a:fld>
             <a:endParaRPr lang="en-US"/>
           </a:p>
@@ -700,7 +703,7 @@
           <a:p>
             <a:fld id="{CEE5B302-F809-4B5B-A910-C95D7EA268A8}" type="datetimeFigureOut">
               <a:rPr lang="en-US" smtClean="0"/>
-              <a:t>30/11/2023</a:t>
+              <a:t>3/12/2023</a:t>
             </a:fld>
             <a:endParaRPr lang="en-US"/>
           </a:p>
@@ -898,7 +901,7 @@
           <a:p>
             <a:fld id="{CEE5B302-F809-4B5B-A910-C95D7EA268A8}" type="datetimeFigureOut">
               <a:rPr lang="en-US" smtClean="0"/>
-              <a:t>30/11/2023</a:t>
+              <a:t>3/12/2023</a:t>
             </a:fld>
             <a:endParaRPr lang="en-US"/>
           </a:p>
@@ -1173,7 +1176,7 @@
           <a:p>
             <a:fld id="{CEE5B302-F809-4B5B-A910-C95D7EA268A8}" type="datetimeFigureOut">
               <a:rPr lang="en-US" smtClean="0"/>
-              <a:t>30/11/2023</a:t>
+              <a:t>3/12/2023</a:t>
             </a:fld>
             <a:endParaRPr lang="en-US"/>
           </a:p>
@@ -1438,7 +1441,7 @@
           <a:p>
             <a:fld id="{CEE5B302-F809-4B5B-A910-C95D7EA268A8}" type="datetimeFigureOut">
               <a:rPr lang="en-US" smtClean="0"/>
-              <a:t>30/11/2023</a:t>
+              <a:t>3/12/2023</a:t>
             </a:fld>
             <a:endParaRPr lang="en-US"/>
           </a:p>
@@ -1850,7 +1853,7 @@
           <a:p>
             <a:fld id="{CEE5B302-F809-4B5B-A910-C95D7EA268A8}" type="datetimeFigureOut">
               <a:rPr lang="en-US" smtClean="0"/>
-              <a:t>30/11/2023</a:t>
+              <a:t>3/12/2023</a:t>
             </a:fld>
             <a:endParaRPr lang="en-US"/>
           </a:p>
@@ -1991,7 +1994,7 @@
           <a:p>
             <a:fld id="{CEE5B302-F809-4B5B-A910-C95D7EA268A8}" type="datetimeFigureOut">
               <a:rPr lang="en-US" smtClean="0"/>
-              <a:t>30/11/2023</a:t>
+              <a:t>3/12/2023</a:t>
             </a:fld>
             <a:endParaRPr lang="en-US"/>
           </a:p>
@@ -2104,7 +2107,7 @@
           <a:p>
             <a:fld id="{CEE5B302-F809-4B5B-A910-C95D7EA268A8}" type="datetimeFigureOut">
               <a:rPr lang="en-US" smtClean="0"/>
-              <a:t>30/11/2023</a:t>
+              <a:t>3/12/2023</a:t>
             </a:fld>
             <a:endParaRPr lang="en-US"/>
           </a:p>
@@ -2415,7 +2418,7 @@
           <a:p>
             <a:fld id="{CEE5B302-F809-4B5B-A910-C95D7EA268A8}" type="datetimeFigureOut">
               <a:rPr lang="en-US" smtClean="0"/>
-              <a:t>30/11/2023</a:t>
+              <a:t>3/12/2023</a:t>
             </a:fld>
             <a:endParaRPr lang="en-US"/>
           </a:p>
@@ -2703,7 +2706,7 @@
           <a:p>
             <a:fld id="{CEE5B302-F809-4B5B-A910-C95D7EA268A8}" type="datetimeFigureOut">
               <a:rPr lang="en-US" smtClean="0"/>
-              <a:t>30/11/2023</a:t>
+              <a:t>3/12/2023</a:t>
             </a:fld>
             <a:endParaRPr lang="en-US"/>
           </a:p>
@@ -2944,7 +2947,7 @@
           <a:p>
             <a:fld id="{CEE5B302-F809-4B5B-A910-C95D7EA268A8}" type="datetimeFigureOut">
               <a:rPr lang="en-US" smtClean="0"/>
-              <a:t>30/11/2023</a:t>
+              <a:t>3/12/2023</a:t>
             </a:fld>
             <a:endParaRPr lang="en-US"/>
           </a:p>
@@ -12975,7 +12978,10 @@
           <a:bodyPr/>
           <a:lstStyle/>
           <a:p>
-            <a:endParaRPr lang="en-US" dirty="0"/>
+            <a:r>
+              <a:rPr lang="en-US" dirty="0"/>
+              <a:t>Optimization</a:t>
+            </a:r>
           </a:p>
         </p:txBody>
       </p:sp>
@@ -13000,7 +13006,128 @@
           <a:bodyPr/>
           <a:lstStyle/>
           <a:p>
-            <a:endParaRPr lang="en-US" dirty="0"/>
+            <a:r>
+              <a:rPr lang="en-US" dirty="0"/>
+              <a:t>Can apply some optimizations to reduce the number of edges</a:t>
+            </a:r>
+          </a:p>
+          <a:p>
+            <a:r>
+              <a:rPr lang="en-US" dirty="0"/>
+              <a:t>Direct edges having the length equal to the sum of two others can be ignored</a:t>
+            </a:r>
+          </a:p>
+          <a:p>
+            <a:r>
+              <a:rPr lang="en-US" dirty="0"/>
+              <a:t>Also combine nodes with the same value (weight = 0)</a:t>
+            </a:r>
+          </a:p>
+        </p:txBody>
+      </p:sp>
+      <p:pic>
+        <p:nvPicPr>
+          <p:cNvPr id="5" name="Picture 4">
+            <a:extLst>
+              <a:ext uri="{FF2B5EF4-FFF2-40B4-BE49-F238E27FC236}">
+                <a16:creationId xmlns:a16="http://schemas.microsoft.com/office/drawing/2014/main" id="{28023FC8-0C84-E06C-5314-024A826E14A8}"/>
+              </a:ext>
+            </a:extLst>
+          </p:cNvPr>
+          <p:cNvPicPr>
+            <a:picLocks noChangeAspect="1"/>
+          </p:cNvPicPr>
+          <p:nvPr/>
+        </p:nvPicPr>
+        <p:blipFill>
+          <a:blip r:embed="rId2"/>
+          <a:stretch>
+            <a:fillRect/>
+          </a:stretch>
+        </p:blipFill>
+        <p:spPr>
+          <a:xfrm>
+            <a:off x="2263139" y="3845041"/>
+            <a:ext cx="2430991" cy="2331922"/>
+          </a:xfrm>
+          <a:prstGeom prst="rect">
+            <a:avLst/>
+          </a:prstGeom>
+        </p:spPr>
+      </p:pic>
+      <p:pic>
+        <p:nvPicPr>
+          <p:cNvPr id="7" name="Picture 6">
+            <a:extLst>
+              <a:ext uri="{FF2B5EF4-FFF2-40B4-BE49-F238E27FC236}">
+                <a16:creationId xmlns:a16="http://schemas.microsoft.com/office/drawing/2014/main" id="{7F2BBDBA-024E-FF0D-93F2-1916A8A00C70}"/>
+              </a:ext>
+            </a:extLst>
+          </p:cNvPr>
+          <p:cNvPicPr>
+            <a:picLocks noChangeAspect="1"/>
+          </p:cNvPicPr>
+          <p:nvPr/>
+        </p:nvPicPr>
+        <p:blipFill>
+          <a:blip r:embed="rId3"/>
+          <a:stretch>
+            <a:fillRect/>
+          </a:stretch>
+        </p:blipFill>
+        <p:spPr>
+          <a:xfrm>
+            <a:off x="6740587" y="3845041"/>
+            <a:ext cx="2469094" cy="2034716"/>
+          </a:xfrm>
+          <a:prstGeom prst="rect">
+            <a:avLst/>
+          </a:prstGeom>
+        </p:spPr>
+      </p:pic>
+      <p:sp>
+        <p:nvSpPr>
+          <p:cNvPr id="8" name="Arrow: Right 7">
+            <a:extLst>
+              <a:ext uri="{FF2B5EF4-FFF2-40B4-BE49-F238E27FC236}">
+                <a16:creationId xmlns:a16="http://schemas.microsoft.com/office/drawing/2014/main" id="{CD1AD4D6-81BA-7DA4-F44D-5EC1BC103070}"/>
+              </a:ext>
+            </a:extLst>
+          </p:cNvPr>
+          <p:cNvSpPr/>
+          <p:nvPr/>
+        </p:nvSpPr>
+        <p:spPr>
+          <a:xfrm>
+            <a:off x="4974672" y="4308533"/>
+            <a:ext cx="1526796" cy="964734"/>
+          </a:xfrm>
+          <a:prstGeom prst="rightArrow">
+            <a:avLst/>
+          </a:prstGeom>
+        </p:spPr>
+        <p:style>
+          <a:lnRef idx="2">
+            <a:schemeClr val="accent1">
+              <a:shade val="15000"/>
+            </a:schemeClr>
+          </a:lnRef>
+          <a:fillRef idx="1">
+            <a:schemeClr val="accent1"/>
+          </a:fillRef>
+          <a:effectRef idx="0">
+            <a:schemeClr val="accent1"/>
+          </a:effectRef>
+          <a:fontRef idx="minor">
+            <a:schemeClr val="lt1"/>
+          </a:fontRef>
+        </p:style>
+        <p:txBody>
+          <a:bodyPr rtlCol="0" anchor="ctr"/>
+          <a:lstStyle/>
+          <a:p>
+            <a:pPr algn="ctr"/>
+            <a:endParaRPr lang="en-US"/>
           </a:p>
         </p:txBody>
       </p:sp>
@@ -13008,6 +13135,454 @@
     <p:extLst>
       <p:ext uri="{BB962C8B-B14F-4D97-AF65-F5344CB8AC3E}">
         <p14:creationId xmlns:p14="http://schemas.microsoft.com/office/powerpoint/2010/main" val="179100207"/>
+      </p:ext>
+    </p:extLst>
+  </p:cSld>
+  <p:clrMapOvr>
+    <a:masterClrMapping/>
+  </p:clrMapOvr>
+</p:sld>
+</file>
+
+<file path=ppt/slides/slide37.xml><?xml version="1.0" encoding="utf-8"?>
+<p:sld xmlns:a="http://schemas.openxmlformats.org/drawingml/2006/main" xmlns:r="http://schemas.openxmlformats.org/officeDocument/2006/relationships" xmlns:p="http://schemas.openxmlformats.org/presentationml/2006/main">
+  <p:cSld>
+    <p:spTree>
+      <p:nvGrpSpPr>
+        <p:cNvPr id="1" name=""/>
+        <p:cNvGrpSpPr/>
+        <p:nvPr/>
+      </p:nvGrpSpPr>
+      <p:grpSpPr>
+        <a:xfrm>
+          <a:off x="0" y="0"/>
+          <a:ext cx="0" cy="0"/>
+          <a:chOff x="0" y="0"/>
+          <a:chExt cx="0" cy="0"/>
+        </a:xfrm>
+      </p:grpSpPr>
+      <p:sp>
+        <p:nvSpPr>
+          <p:cNvPr id="2" name="Title 1">
+            <a:extLst>
+              <a:ext uri="{FF2B5EF4-FFF2-40B4-BE49-F238E27FC236}">
+                <a16:creationId xmlns:a16="http://schemas.microsoft.com/office/drawing/2014/main" id="{F5B89183-85F7-0746-93DC-B9771937C8F0}"/>
+              </a:ext>
+            </a:extLst>
+          </p:cNvPr>
+          <p:cNvSpPr>
+            <a:spLocks noGrp="1"/>
+          </p:cNvSpPr>
+          <p:nvPr>
+            <p:ph type="title"/>
+          </p:nvPr>
+        </p:nvSpPr>
+        <p:spPr/>
+        <p:txBody>
+          <a:bodyPr/>
+          <a:lstStyle/>
+          <a:p>
+            <a:r>
+              <a:rPr lang="en-US" dirty="0"/>
+              <a:t>Optimization</a:t>
+            </a:r>
+          </a:p>
+        </p:txBody>
+      </p:sp>
+      <mc:AlternateContent xmlns:mc="http://schemas.openxmlformats.org/markup-compatibility/2006">
+        <mc:Choice xmlns:a14="http://schemas.microsoft.com/office/drawing/2010/main" Requires="a14">
+          <p:sp>
+            <p:nvSpPr>
+              <p:cNvPr id="3" name="Content Placeholder 2">
+                <a:extLst>
+                  <a:ext uri="{FF2B5EF4-FFF2-40B4-BE49-F238E27FC236}">
+                    <a16:creationId xmlns:a16="http://schemas.microsoft.com/office/drawing/2014/main" id="{9BDCAAEE-C419-6C9B-21DA-FC699D155A34}"/>
+                  </a:ext>
+                </a:extLst>
+              </p:cNvPr>
+              <p:cNvSpPr>
+                <a:spLocks noGrp="1"/>
+              </p:cNvSpPr>
+              <p:nvPr>
+                <p:ph idx="1"/>
+              </p:nvPr>
+            </p:nvSpPr>
+            <p:spPr/>
+            <p:txBody>
+              <a:bodyPr/>
+              <a:lstStyle/>
+              <a:p>
+                <a:r>
+                  <a:rPr lang="en-US" dirty="0"/>
+                  <a:t>Effectiveness:</a:t>
+                </a:r>
+              </a:p>
+              <a:p>
+                <a:pPr lvl="1"/>
+                <a14:m>
+                  <m:oMath xmlns:m="http://schemas.openxmlformats.org/officeDocument/2006/math">
+                    <m:r>
+                      <a:rPr lang="en-US" b="0" i="1" smtClean="0">
+                        <a:latin typeface="Cambria Math" panose="02040503050406030204" pitchFamily="18" charset="0"/>
+                      </a:rPr>
+                      <m:t>≈40%</m:t>
+                    </m:r>
+                  </m:oMath>
+                </a14:m>
+                <a:r>
+                  <a:rPr lang="en-US" dirty="0"/>
+                  <a:t> of the edges removed in the MP tree construction problem</a:t>
+                </a:r>
+              </a:p>
+              <a:p>
+                <a:pPr lvl="1"/>
+                <a:r>
+                  <a:rPr lang="en-US" dirty="0"/>
+                  <a:t>Increased the solvable size of the problem from </a:t>
+                </a:r>
+                <a14:m>
+                  <m:oMath xmlns:m="http://schemas.openxmlformats.org/officeDocument/2006/math">
+                    <m:r>
+                      <a:rPr lang="en-US" b="0" i="1" smtClean="0">
+                        <a:latin typeface="Cambria Math" panose="02040503050406030204" pitchFamily="18" charset="0"/>
+                      </a:rPr>
+                      <m:t>5</m:t>
+                    </m:r>
+                  </m:oMath>
+                </a14:m>
+                <a:r>
+                  <a:rPr lang="en-US" dirty="0"/>
+                  <a:t> of the complete graph to </a:t>
+                </a:r>
+                <a14:m>
+                  <m:oMath xmlns:m="http://schemas.openxmlformats.org/officeDocument/2006/math">
+                    <m:r>
+                      <a:rPr lang="en-US" b="0" i="1" smtClean="0">
+                        <a:latin typeface="Cambria Math" panose="02040503050406030204" pitchFamily="18" charset="0"/>
+                      </a:rPr>
+                      <m:t>6</m:t>
+                    </m:r>
+                  </m:oMath>
+                </a14:m>
+                <a:r>
+                  <a:rPr lang="en-US" dirty="0"/>
+                  <a:t> terminals</a:t>
+                </a:r>
+              </a:p>
+              <a:p>
+                <a:r>
+                  <a:rPr lang="en-US" dirty="0"/>
+                  <a:t>Result can be augmented by changing the multiply factor (</a:t>
+                </a:r>
+                <a14:m>
+                  <m:oMath xmlns:m="http://schemas.openxmlformats.org/officeDocument/2006/math">
+                    <m:r>
+                      <a:rPr lang="en-US" b="0" i="1" smtClean="0">
+                        <a:latin typeface="Cambria Math" panose="02040503050406030204" pitchFamily="18" charset="0"/>
+                      </a:rPr>
+                      <m:t>𝜆</m:t>
+                    </m:r>
+                  </m:oMath>
+                </a14:m>
+                <a:r>
+                  <a:rPr lang="en-US" dirty="0"/>
+                  <a:t>) of constraints</a:t>
+                </a:r>
+              </a:p>
+              <a:p>
+                <a:pPr lvl="1"/>
+                <a:r>
+                  <a:rPr lang="en-US" dirty="0"/>
+                  <a:t>After augmenting, the solution has the probability to construct an accepted Steiner tree of </a:t>
+                </a:r>
+                <a14:m>
+                  <m:oMath xmlns:m="http://schemas.openxmlformats.org/officeDocument/2006/math">
+                    <m:r>
+                      <a:rPr lang="en-US" b="0" i="1" smtClean="0">
+                        <a:latin typeface="Cambria Math" panose="02040503050406030204" pitchFamily="18" charset="0"/>
+                      </a:rPr>
+                      <m:t>1.17%</m:t>
+                    </m:r>
+                  </m:oMath>
+                </a14:m>
+                <a:r>
+                  <a:rPr lang="en-US" dirty="0"/>
+                  <a:t> for 4 terminals and </a:t>
+                </a:r>
+                <a14:m>
+                  <m:oMath xmlns:m="http://schemas.openxmlformats.org/officeDocument/2006/math">
+                    <m:r>
+                      <a:rPr lang="en-US" b="0" i="1" smtClean="0">
+                        <a:latin typeface="Cambria Math" panose="02040503050406030204" pitchFamily="18" charset="0"/>
+                      </a:rPr>
+                      <m:t>0.02%</m:t>
+                    </m:r>
+                  </m:oMath>
+                </a14:m>
+                <a:r>
+                  <a:rPr lang="en-US" dirty="0"/>
+                  <a:t> for 5 terminals.</a:t>
+                </a:r>
+              </a:p>
+            </p:txBody>
+          </p:sp>
+        </mc:Choice>
+        <mc:Fallback>
+          <p:sp>
+            <p:nvSpPr>
+              <p:cNvPr id="3" name="Content Placeholder 2">
+                <a:extLst>
+                  <a:ext uri="{FF2B5EF4-FFF2-40B4-BE49-F238E27FC236}">
+                    <a16:creationId xmlns:a16="http://schemas.microsoft.com/office/drawing/2014/main" id="{9BDCAAEE-C419-6C9B-21DA-FC699D155A34}"/>
+                  </a:ext>
+                </a:extLst>
+              </p:cNvPr>
+              <p:cNvSpPr>
+                <a:spLocks noGrp="1" noRot="1" noChangeAspect="1" noMove="1" noResize="1" noEditPoints="1" noAdjustHandles="1" noChangeArrowheads="1" noChangeShapeType="1" noTextEdit="1"/>
+              </p:cNvSpPr>
+              <p:nvPr>
+                <p:ph idx="1"/>
+              </p:nvPr>
+            </p:nvSpPr>
+            <p:spPr>
+              <a:blipFill>
+                <a:blip r:embed="rId2"/>
+                <a:stretch>
+                  <a:fillRect l="-1043" t="-2241"/>
+                </a:stretch>
+              </a:blipFill>
+            </p:spPr>
+            <p:txBody>
+              <a:bodyPr/>
+              <a:lstStyle/>
+              <a:p>
+                <a:r>
+                  <a:rPr lang="en-US">
+                    <a:noFill/>
+                  </a:rPr>
+                  <a:t> </a:t>
+                </a:r>
+              </a:p>
+            </p:txBody>
+          </p:sp>
+        </mc:Fallback>
+      </mc:AlternateContent>
+    </p:spTree>
+    <p:extLst>
+      <p:ext uri="{BB962C8B-B14F-4D97-AF65-F5344CB8AC3E}">
+        <p14:creationId xmlns:p14="http://schemas.microsoft.com/office/powerpoint/2010/main" val="2382668632"/>
+      </p:ext>
+    </p:extLst>
+  </p:cSld>
+  <p:clrMapOvr>
+    <a:masterClrMapping/>
+  </p:clrMapOvr>
+</p:sld>
+</file>
+
+<file path=ppt/slides/slide38.xml><?xml version="1.0" encoding="utf-8"?>
+<p:sld xmlns:a="http://schemas.openxmlformats.org/drawingml/2006/main" xmlns:r="http://schemas.openxmlformats.org/officeDocument/2006/relationships" xmlns:p="http://schemas.openxmlformats.org/presentationml/2006/main">
+  <p:cSld>
+    <p:spTree>
+      <p:nvGrpSpPr>
+        <p:cNvPr id="1" name=""/>
+        <p:cNvGrpSpPr/>
+        <p:nvPr/>
+      </p:nvGrpSpPr>
+      <p:grpSpPr>
+        <a:xfrm>
+          <a:off x="0" y="0"/>
+          <a:ext cx="0" cy="0"/>
+          <a:chOff x="0" y="0"/>
+          <a:chExt cx="0" cy="0"/>
+        </a:xfrm>
+      </p:grpSpPr>
+      <p:sp>
+        <p:nvSpPr>
+          <p:cNvPr id="2" name="Title 1">
+            <a:extLst>
+              <a:ext uri="{FF2B5EF4-FFF2-40B4-BE49-F238E27FC236}">
+                <a16:creationId xmlns:a16="http://schemas.microsoft.com/office/drawing/2014/main" id="{0A96CF10-F533-B787-F8A6-57201AB8C549}"/>
+              </a:ext>
+            </a:extLst>
+          </p:cNvPr>
+          <p:cNvSpPr>
+            <a:spLocks noGrp="1"/>
+          </p:cNvSpPr>
+          <p:nvPr>
+            <p:ph type="title"/>
+          </p:nvPr>
+        </p:nvSpPr>
+        <p:spPr/>
+        <p:txBody>
+          <a:bodyPr/>
+          <a:lstStyle/>
+          <a:p>
+            <a:r>
+              <a:rPr lang="en-US" dirty="0"/>
+              <a:t>Optimization</a:t>
+            </a:r>
+          </a:p>
+        </p:txBody>
+      </p:sp>
+      <p:sp>
+        <p:nvSpPr>
+          <p:cNvPr id="3" name="Content Placeholder 2">
+            <a:extLst>
+              <a:ext uri="{FF2B5EF4-FFF2-40B4-BE49-F238E27FC236}">
+                <a16:creationId xmlns:a16="http://schemas.microsoft.com/office/drawing/2014/main" id="{638E086B-695B-755F-6129-AFAD0D061666}"/>
+              </a:ext>
+            </a:extLst>
+          </p:cNvPr>
+          <p:cNvSpPr>
+            <a:spLocks noGrp="1"/>
+          </p:cNvSpPr>
+          <p:nvPr>
+            <p:ph idx="1"/>
+          </p:nvPr>
+        </p:nvSpPr>
+        <p:spPr/>
+        <p:txBody>
+          <a:bodyPr/>
+          <a:lstStyle/>
+          <a:p>
+            <a:r>
+              <a:rPr lang="en-US" dirty="0"/>
+              <a:t>Pick the center node among the terminals (i.e. the node having the smallest maximum total distance to others) as the DAG root.</a:t>
+            </a:r>
+          </a:p>
+          <a:p>
+            <a:r>
+              <a:rPr lang="en-US" dirty="0"/>
+              <a:t>Does not reduce the number of edge in most cases.</a:t>
+            </a:r>
+          </a:p>
+          <a:p>
+            <a:r>
+              <a:rPr lang="en-US" dirty="0"/>
+              <a:t>Unsure if increased success chance</a:t>
+            </a:r>
+          </a:p>
+        </p:txBody>
+      </p:sp>
+    </p:spTree>
+    <p:extLst>
+      <p:ext uri="{BB962C8B-B14F-4D97-AF65-F5344CB8AC3E}">
+        <p14:creationId xmlns:p14="http://schemas.microsoft.com/office/powerpoint/2010/main" val="1208922309"/>
+      </p:ext>
+    </p:extLst>
+  </p:cSld>
+  <p:clrMapOvr>
+    <a:masterClrMapping/>
+  </p:clrMapOvr>
+</p:sld>
+</file>
+
+<file path=ppt/slides/slide39.xml><?xml version="1.0" encoding="utf-8"?>
+<p:sld xmlns:a="http://schemas.openxmlformats.org/drawingml/2006/main" xmlns:r="http://schemas.openxmlformats.org/officeDocument/2006/relationships" xmlns:p="http://schemas.openxmlformats.org/presentationml/2006/main">
+  <p:cSld>
+    <p:spTree>
+      <p:nvGrpSpPr>
+        <p:cNvPr id="1" name=""/>
+        <p:cNvGrpSpPr/>
+        <p:nvPr/>
+      </p:nvGrpSpPr>
+      <p:grpSpPr>
+        <a:xfrm>
+          <a:off x="0" y="0"/>
+          <a:ext cx="0" cy="0"/>
+          <a:chOff x="0" y="0"/>
+          <a:chExt cx="0" cy="0"/>
+        </a:xfrm>
+      </p:grpSpPr>
+      <p:sp>
+        <p:nvSpPr>
+          <p:cNvPr id="2" name="Title 1">
+            <a:extLst>
+              <a:ext uri="{FF2B5EF4-FFF2-40B4-BE49-F238E27FC236}">
+                <a16:creationId xmlns:a16="http://schemas.microsoft.com/office/drawing/2014/main" id="{9EEC2E21-CE6A-859A-222F-E793867EB2CC}"/>
+              </a:ext>
+            </a:extLst>
+          </p:cNvPr>
+          <p:cNvSpPr>
+            <a:spLocks noGrp="1"/>
+          </p:cNvSpPr>
+          <p:nvPr>
+            <p:ph type="title"/>
+          </p:nvPr>
+        </p:nvSpPr>
+        <p:spPr/>
+        <p:txBody>
+          <a:bodyPr/>
+          <a:lstStyle/>
+          <a:p>
+            <a:r>
+              <a:rPr lang="en-US" dirty="0"/>
+              <a:t>Optimization</a:t>
+            </a:r>
+          </a:p>
+        </p:txBody>
+      </p:sp>
+      <p:sp>
+        <p:nvSpPr>
+          <p:cNvPr id="3" name="Content Placeholder 2">
+            <a:extLst>
+              <a:ext uri="{FF2B5EF4-FFF2-40B4-BE49-F238E27FC236}">
+                <a16:creationId xmlns:a16="http://schemas.microsoft.com/office/drawing/2014/main" id="{61046329-7837-ADB3-AA2C-A5D9300B77B6}"/>
+              </a:ext>
+            </a:extLst>
+          </p:cNvPr>
+          <p:cNvSpPr>
+            <a:spLocks noGrp="1"/>
+          </p:cNvSpPr>
+          <p:nvPr>
+            <p:ph idx="1"/>
+          </p:nvPr>
+        </p:nvSpPr>
+        <p:spPr/>
+        <p:txBody>
+          <a:bodyPr/>
+          <a:lstStyle/>
+          <a:p>
+            <a:pPr marL="0" indent="0">
+              <a:buNone/>
+            </a:pPr>
+            <a:r>
+              <a:rPr lang="en-US" dirty="0"/>
+              <a:t>Other optimizations:</a:t>
+            </a:r>
+          </a:p>
+          <a:p>
+            <a:r>
+              <a:rPr lang="en-US" dirty="0"/>
+              <a:t>Add a constraint that terminals should not have any edge leaving them</a:t>
+            </a:r>
+          </a:p>
+          <a:p>
+            <a:pPr lvl="1"/>
+            <a:r>
+              <a:rPr lang="en-US" dirty="0"/>
+              <a:t>Only available if terminals are not combined</a:t>
+            </a:r>
+          </a:p>
+          <a:p>
+            <a:pPr lvl="1"/>
+            <a:r>
+              <a:rPr lang="en-US" dirty="0"/>
+              <a:t>Will refine Steiner tree </a:t>
+            </a:r>
+            <a:r>
+              <a:rPr lang="en-US"/>
+              <a:t>creation rate</a:t>
+            </a:r>
+            <a:endParaRPr lang="en-US" dirty="0"/>
+          </a:p>
+        </p:txBody>
+      </p:sp>
+    </p:spTree>
+    <p:extLst>
+      <p:ext uri="{BB962C8B-B14F-4D97-AF65-F5344CB8AC3E}">
+        <p14:creationId xmlns:p14="http://schemas.microsoft.com/office/powerpoint/2010/main" val="1212062557"/>
       </p:ext>
     </p:extLst>
   </p:cSld>

</xml_diff>